<commit_message>
Update Event Driven Architecture
</commit_message>
<xml_diff>
--- a/images/theory_analysis/Event_Driven_Architecture_on_Linux/Event_Driven_Architecture_on_Linux.pptx
+++ b/images/theory_analysis/Event_Driven_Architecture_on_Linux/Event_Driven_Architecture_on_Linux.pptx
@@ -110,7 +110,7 @@
   </p:defaultTextStyle>
   <p:extLst>
     <p:ext uri="{EFAFB233-063F-42B5-8137-9DF3F51BA10A}">
-      <p15:sldGuideLst xmlns:p15="http://schemas.microsoft.com/office/powerpoint/2012/main" xmlns="">
+      <p15:sldGuideLst xmlns="" xmlns:p15="http://schemas.microsoft.com/office/powerpoint/2012/main">
         <p15:guide id="1" orient="horz" pos="2160">
           <p15:clr>
             <a:srgbClr val="A4A3A4"/>
@@ -214,7 +214,7 @@
           <a:p>
             <a:fld id="{6CD5550B-26C4-49A9-A5BA-636EF7BE6CE9}" type="datetimeFigureOut">
               <a:rPr lang="ko-KR" altLang="en-US" smtClean="0"/>
-              <a:t>2017-09-20</a:t>
+              <a:t>2017-09-21</a:t>
             </a:fld>
             <a:endParaRPr lang="ko-KR" altLang="en-US"/>
           </a:p>
@@ -663,7 +663,7 @@
           <a:p>
             <a:fld id="{FB30EDBD-1C2D-4C1E-B459-B60219FAB484}" type="datetimeFigureOut">
               <a:rPr lang="ko-KR" altLang="en-US" smtClean="0"/>
-              <a:t>2017-09-20</a:t>
+              <a:t>2017-09-21</a:t>
             </a:fld>
             <a:endParaRPr lang="ko-KR" altLang="en-US"/>
           </a:p>
@@ -828,7 +828,7 @@
           <a:p>
             <a:fld id="{FB30EDBD-1C2D-4C1E-B459-B60219FAB484}" type="datetimeFigureOut">
               <a:rPr lang="ko-KR" altLang="en-US" smtClean="0"/>
-              <a:t>2017-09-20</a:t>
+              <a:t>2017-09-21</a:t>
             </a:fld>
             <a:endParaRPr lang="ko-KR" altLang="en-US"/>
           </a:p>
@@ -1003,7 +1003,7 @@
           <a:p>
             <a:fld id="{FB30EDBD-1C2D-4C1E-B459-B60219FAB484}" type="datetimeFigureOut">
               <a:rPr lang="ko-KR" altLang="en-US" smtClean="0"/>
-              <a:t>2017-09-20</a:t>
+              <a:t>2017-09-21</a:t>
             </a:fld>
             <a:endParaRPr lang="ko-KR" altLang="en-US"/>
           </a:p>
@@ -1168,7 +1168,7 @@
           <a:p>
             <a:fld id="{FB30EDBD-1C2D-4C1E-B459-B60219FAB484}" type="datetimeFigureOut">
               <a:rPr lang="ko-KR" altLang="en-US" smtClean="0"/>
-              <a:t>2017-09-20</a:t>
+              <a:t>2017-09-21</a:t>
             </a:fld>
             <a:endParaRPr lang="ko-KR" altLang="en-US"/>
           </a:p>
@@ -1416,7 +1416,7 @@
           <a:p>
             <a:fld id="{FB30EDBD-1C2D-4C1E-B459-B60219FAB484}" type="datetimeFigureOut">
               <a:rPr lang="ko-KR" altLang="en-US" smtClean="0"/>
-              <a:t>2017-09-20</a:t>
+              <a:t>2017-09-21</a:t>
             </a:fld>
             <a:endParaRPr lang="ko-KR" altLang="en-US"/>
           </a:p>
@@ -1699,7 +1699,7 @@
           <a:p>
             <a:fld id="{FB30EDBD-1C2D-4C1E-B459-B60219FAB484}" type="datetimeFigureOut">
               <a:rPr lang="ko-KR" altLang="en-US" smtClean="0"/>
-              <a:t>2017-09-20</a:t>
+              <a:t>2017-09-21</a:t>
             </a:fld>
             <a:endParaRPr lang="ko-KR" altLang="en-US"/>
           </a:p>
@@ -2116,7 +2116,7 @@
           <a:p>
             <a:fld id="{FB30EDBD-1C2D-4C1E-B459-B60219FAB484}" type="datetimeFigureOut">
               <a:rPr lang="ko-KR" altLang="en-US" smtClean="0"/>
-              <a:t>2017-09-20</a:t>
+              <a:t>2017-09-21</a:t>
             </a:fld>
             <a:endParaRPr lang="ko-KR" altLang="en-US"/>
           </a:p>
@@ -2229,7 +2229,7 @@
           <a:p>
             <a:fld id="{FB30EDBD-1C2D-4C1E-B459-B60219FAB484}" type="datetimeFigureOut">
               <a:rPr lang="ko-KR" altLang="en-US" smtClean="0"/>
-              <a:t>2017-09-20</a:t>
+              <a:t>2017-09-21</a:t>
             </a:fld>
             <a:endParaRPr lang="ko-KR" altLang="en-US"/>
           </a:p>
@@ -2319,7 +2319,7 @@
           <a:p>
             <a:fld id="{FB30EDBD-1C2D-4C1E-B459-B60219FAB484}" type="datetimeFigureOut">
               <a:rPr lang="ko-KR" altLang="en-US" smtClean="0"/>
-              <a:t>2017-09-20</a:t>
+              <a:t>2017-09-21</a:t>
             </a:fld>
             <a:endParaRPr lang="ko-KR" altLang="en-US"/>
           </a:p>
@@ -2591,7 +2591,7 @@
           <a:p>
             <a:fld id="{FB30EDBD-1C2D-4C1E-B459-B60219FAB484}" type="datetimeFigureOut">
               <a:rPr lang="ko-KR" altLang="en-US" smtClean="0"/>
-              <a:t>2017-09-20</a:t>
+              <a:t>2017-09-21</a:t>
             </a:fld>
             <a:endParaRPr lang="ko-KR" altLang="en-US"/>
           </a:p>
@@ -2839,7 +2839,7 @@
           <a:p>
             <a:fld id="{FB30EDBD-1C2D-4C1E-B459-B60219FAB484}" type="datetimeFigureOut">
               <a:rPr lang="ko-KR" altLang="en-US" smtClean="0"/>
-              <a:t>2017-09-20</a:t>
+              <a:t>2017-09-21</a:t>
             </a:fld>
             <a:endParaRPr lang="ko-KR" altLang="en-US"/>
           </a:p>
@@ -3047,7 +3047,7 @@
           <a:p>
             <a:fld id="{FB30EDBD-1C2D-4C1E-B459-B60219FAB484}" type="datetimeFigureOut">
               <a:rPr lang="ko-KR" altLang="en-US" smtClean="0"/>
-              <a:t>2017-09-20</a:t>
+              <a:t>2017-09-21</a:t>
             </a:fld>
             <a:endParaRPr lang="ko-KR" altLang="en-US"/>
           </a:p>
@@ -3776,6 +3776,44 @@
               <a:t>Event Handler</a:t>
             </a:r>
             <a:endParaRPr lang="ko-KR" altLang="en-US" dirty="0"/>
+          </a:p>
+        </p:txBody>
+      </p:sp>
+      <p:sp>
+        <p:nvSpPr>
+          <p:cNvPr id="15" name="TextBox 14"/>
+          <p:cNvSpPr txBox="1"/>
+          <p:nvPr/>
+        </p:nvSpPr>
+        <p:spPr>
+          <a:xfrm>
+            <a:off x="3635896" y="2624594"/>
+            <a:ext cx="1656184" cy="523220"/>
+          </a:xfrm>
+          <a:prstGeom prst="rect">
+            <a:avLst/>
+          </a:prstGeom>
+          <a:noFill/>
+        </p:spPr>
+        <p:txBody>
+          <a:bodyPr wrap="square" rtlCol="0">
+            <a:spAutoFit/>
+          </a:bodyPr>
+          <a:lstStyle/>
+          <a:p>
+            <a:pPr algn="ctr"/>
+            <a:r>
+              <a:rPr lang="en-US" altLang="ko-KR" sz="1400" dirty="0" smtClean="0"/>
+              <a:t>I/O</a:t>
+            </a:r>
+          </a:p>
+          <a:p>
+            <a:pPr algn="ctr"/>
+            <a:r>
+              <a:rPr lang="en-US" altLang="ko-KR" sz="1400" dirty="0" smtClean="0"/>
+              <a:t>Multiplexer</a:t>
+            </a:r>
+            <a:endParaRPr lang="ko-KR" altLang="en-US" sz="1400" dirty="0"/>
           </a:p>
         </p:txBody>
       </p:sp>

</xml_diff>